<commit_message>
Added links within notebooks
</commit_message>
<xml_diff>
--- a/Lifestyle Choice Are Better Indicator of Chronic Disease.pptx
+++ b/Lifestyle Choice Are Better Indicator of Chronic Disease.pptx
@@ -5186,16 +5186,16 @@
           <a:p>
             <a:r>
               <a:rPr lang="en-US" dirty="0"/>
+              <a:t>Medications and screenings</a:t>
+            </a:r>
+          </a:p>
+          <a:p>
+            <a:endParaRPr lang="en-US" dirty="0"/>
+          </a:p>
+          <a:p>
+            <a:r>
+              <a:rPr lang="en-US" dirty="0"/>
               <a:t>Focus on lifestyle changes</a:t>
-            </a:r>
-          </a:p>
-          <a:p>
-            <a:endParaRPr lang="en-US" dirty="0"/>
-          </a:p>
-          <a:p>
-            <a:r>
-              <a:rPr lang="en-US" dirty="0"/>
-              <a:t>Medications and screenings</a:t>
             </a:r>
           </a:p>
           <a:p>

</xml_diff>